<commit_message>
Adjusted Idea Pitch PP
Added chapter "Why agile?" and removed "Goals" as they should be presented in "Future state" in my opinion.
</commit_message>
<xml_diff>
--- a/Idea_Pitch.pptx
+++ b/Idea_Pitch.pptx
@@ -262,7 +262,7 @@
           <a:p>
             <a:fld id="{807B79D4-6B5A-1F4B-893F-FAFE452DC4BF}" type="datetimeFigureOut">
               <a:rPr lang="de-DE" smtClean="0"/>
-              <a:t>02.10.2019</a:t>
+              <a:t>02.10.19</a:t>
             </a:fld>
             <a:endParaRPr lang="de-DE"/>
           </a:p>
@@ -460,7 +460,7 @@
           <a:p>
             <a:fld id="{807B79D4-6B5A-1F4B-893F-FAFE452DC4BF}" type="datetimeFigureOut">
               <a:rPr lang="de-DE" smtClean="0"/>
-              <a:t>02.10.2019</a:t>
+              <a:t>02.10.19</a:t>
             </a:fld>
             <a:endParaRPr lang="de-DE"/>
           </a:p>
@@ -668,7 +668,7 @@
           <a:p>
             <a:fld id="{807B79D4-6B5A-1F4B-893F-FAFE452DC4BF}" type="datetimeFigureOut">
               <a:rPr lang="de-DE" smtClean="0"/>
-              <a:t>02.10.2019</a:t>
+              <a:t>02.10.19</a:t>
             </a:fld>
             <a:endParaRPr lang="de-DE"/>
           </a:p>
@@ -866,7 +866,7 @@
           <a:p>
             <a:fld id="{807B79D4-6B5A-1F4B-893F-FAFE452DC4BF}" type="datetimeFigureOut">
               <a:rPr lang="de-DE" smtClean="0"/>
-              <a:t>02.10.2019</a:t>
+              <a:t>02.10.19</a:t>
             </a:fld>
             <a:endParaRPr lang="de-DE"/>
           </a:p>
@@ -1141,7 +1141,7 @@
           <a:p>
             <a:fld id="{807B79D4-6B5A-1F4B-893F-FAFE452DC4BF}" type="datetimeFigureOut">
               <a:rPr lang="de-DE" smtClean="0"/>
-              <a:t>02.10.2019</a:t>
+              <a:t>02.10.19</a:t>
             </a:fld>
             <a:endParaRPr lang="de-DE"/>
           </a:p>
@@ -1406,7 +1406,7 @@
           <a:p>
             <a:fld id="{807B79D4-6B5A-1F4B-893F-FAFE452DC4BF}" type="datetimeFigureOut">
               <a:rPr lang="de-DE" smtClean="0"/>
-              <a:t>02.10.2019</a:t>
+              <a:t>02.10.19</a:t>
             </a:fld>
             <a:endParaRPr lang="de-DE"/>
           </a:p>
@@ -1818,7 +1818,7 @@
           <a:p>
             <a:fld id="{807B79D4-6B5A-1F4B-893F-FAFE452DC4BF}" type="datetimeFigureOut">
               <a:rPr lang="de-DE" smtClean="0"/>
-              <a:t>02.10.2019</a:t>
+              <a:t>02.10.19</a:t>
             </a:fld>
             <a:endParaRPr lang="de-DE"/>
           </a:p>
@@ -1959,7 +1959,7 @@
           <a:p>
             <a:fld id="{807B79D4-6B5A-1F4B-893F-FAFE452DC4BF}" type="datetimeFigureOut">
               <a:rPr lang="de-DE" smtClean="0"/>
-              <a:t>02.10.2019</a:t>
+              <a:t>02.10.19</a:t>
             </a:fld>
             <a:endParaRPr lang="de-DE"/>
           </a:p>
@@ -2072,7 +2072,7 @@
           <a:p>
             <a:fld id="{807B79D4-6B5A-1F4B-893F-FAFE452DC4BF}" type="datetimeFigureOut">
               <a:rPr lang="de-DE" smtClean="0"/>
-              <a:t>02.10.2019</a:t>
+              <a:t>02.10.19</a:t>
             </a:fld>
             <a:endParaRPr lang="de-DE"/>
           </a:p>
@@ -2383,7 +2383,7 @@
           <a:p>
             <a:fld id="{807B79D4-6B5A-1F4B-893F-FAFE452DC4BF}" type="datetimeFigureOut">
               <a:rPr lang="de-DE" smtClean="0"/>
-              <a:t>02.10.2019</a:t>
+              <a:t>02.10.19</a:t>
             </a:fld>
             <a:endParaRPr lang="de-DE"/>
           </a:p>
@@ -2671,7 +2671,7 @@
           <a:p>
             <a:fld id="{807B79D4-6B5A-1F4B-893F-FAFE452DC4BF}" type="datetimeFigureOut">
               <a:rPr lang="de-DE" smtClean="0"/>
-              <a:t>02.10.2019</a:t>
+              <a:t>02.10.19</a:t>
             </a:fld>
             <a:endParaRPr lang="de-DE"/>
           </a:p>
@@ -2912,7 +2912,7 @@
           <a:p>
             <a:fld id="{807B79D4-6B5A-1F4B-893F-FAFE452DC4BF}" type="datetimeFigureOut">
               <a:rPr lang="de-DE" smtClean="0"/>
-              <a:t>02.10.2019</a:t>
+              <a:t>02.10.19</a:t>
             </a:fld>
             <a:endParaRPr lang="de-DE"/>
           </a:p>
@@ -3650,55 +3650,374 @@
           <a:lstStyle/>
           <a:p>
             <a:r>
+              <a:rPr lang="de-CH" dirty="0" err="1"/>
+              <a:t>Why</a:t>
+            </a:r>
+            <a:r>
               <a:rPr lang="de-CH" dirty="0"/>
-              <a:t>Target </a:t>
-            </a:r>
-            <a:r>
-              <a:rPr lang="de-CH" dirty="0" err="1"/>
-              <a:t>state</a:t>
-            </a:r>
-            <a:r>
-              <a:rPr lang="de-CH" dirty="0"/>
+              <a:t> agile?</a:t>
+            </a:r>
+          </a:p>
+        </p:txBody>
+      </p:sp>
+      <p:pic>
+        <p:nvPicPr>
+          <p:cNvPr id="5" name="Grafik 4">
+            <a:extLst>
+              <a:ext uri="{FF2B5EF4-FFF2-40B4-BE49-F238E27FC236}">
+                <a16:creationId xmlns:a16="http://schemas.microsoft.com/office/drawing/2014/main" id="{00953221-7AB9-054E-9AE5-815A6121C98E}"/>
+              </a:ext>
+            </a:extLst>
+          </p:cNvPr>
+          <p:cNvPicPr>
+            <a:picLocks noChangeAspect="1"/>
+          </p:cNvPicPr>
+          <p:nvPr/>
+        </p:nvPicPr>
+        <p:blipFill>
+          <a:blip r:embed="rId2"/>
+          <a:stretch>
+            <a:fillRect/>
+          </a:stretch>
+        </p:blipFill>
+        <p:spPr>
+          <a:xfrm>
+            <a:off x="1524793" y="1690688"/>
+            <a:ext cx="9142413" cy="4219575"/>
+          </a:xfrm>
+          <a:prstGeom prst="rect">
+            <a:avLst/>
+          </a:prstGeom>
+        </p:spPr>
+      </p:pic>
+      <p:sp>
+        <p:nvSpPr>
+          <p:cNvPr id="6" name="Rechteck 5">
+            <a:extLst>
+              <a:ext uri="{FF2B5EF4-FFF2-40B4-BE49-F238E27FC236}">
+                <a16:creationId xmlns:a16="http://schemas.microsoft.com/office/drawing/2014/main" id="{8A078134-4579-4B4E-96F7-7BBE49C68127}"/>
+              </a:ext>
+            </a:extLst>
+          </p:cNvPr>
+          <p:cNvSpPr/>
+          <p:nvPr/>
+        </p:nvSpPr>
+        <p:spPr>
+          <a:xfrm>
+            <a:off x="2043119" y="1585913"/>
+            <a:ext cx="8643937" cy="4200525"/>
+          </a:xfrm>
+          <a:prstGeom prst="rect">
+            <a:avLst/>
+          </a:prstGeom>
+          <a:gradFill flip="none" rotWithShape="1">
+            <a:gsLst>
+              <a:gs pos="0">
+                <a:schemeClr val="accent1">
+                  <a:lumMod val="5000"/>
+                  <a:lumOff val="95000"/>
+                  <a:alpha val="0"/>
+                </a:schemeClr>
+              </a:gs>
+              <a:gs pos="50000">
+                <a:srgbClr val="FBFCFE">
+                  <a:alpha val="0"/>
+                </a:srgbClr>
+              </a:gs>
+              <a:gs pos="50000">
+                <a:schemeClr val="accent1">
+                  <a:lumMod val="0"/>
+                  <a:lumOff val="100000"/>
+                </a:schemeClr>
+              </a:gs>
+            </a:gsLst>
+            <a:lin ang="19800000" scaled="0"/>
+            <a:tileRect/>
+          </a:gradFill>
+          <a:ln>
+            <a:noFill/>
+          </a:ln>
+        </p:spPr>
+        <p:style>
+          <a:lnRef idx="2">
+            <a:schemeClr val="accent1">
+              <a:shade val="50000"/>
+            </a:schemeClr>
+          </a:lnRef>
+          <a:fillRef idx="1">
+            <a:schemeClr val="accent1"/>
+          </a:fillRef>
+          <a:effectRef idx="0">
+            <a:schemeClr val="accent1"/>
+          </a:effectRef>
+          <a:fontRef idx="minor">
+            <a:schemeClr val="lt1"/>
+          </a:fontRef>
+        </p:style>
+        <p:txBody>
+          <a:bodyPr rtlCol="0" anchor="ctr"/>
+          <a:lstStyle/>
+          <a:p>
+            <a:pPr algn="ctr"/>
+            <a:endParaRPr lang="de-DE" dirty="0">
+              <a:noFill/>
+            </a:endParaRPr>
+          </a:p>
+        </p:txBody>
+      </p:sp>
+      <p:grpSp>
+        <p:nvGrpSpPr>
+          <p:cNvPr id="9" name="Gruppieren 8">
+            <a:extLst>
+              <a:ext uri="{FF2B5EF4-FFF2-40B4-BE49-F238E27FC236}">
+                <a16:creationId xmlns:a16="http://schemas.microsoft.com/office/drawing/2014/main" id="{70BBE6D3-9727-104E-80A3-9FC9A9C3503C}"/>
+              </a:ext>
+            </a:extLst>
+          </p:cNvPr>
+          <p:cNvGrpSpPr/>
+          <p:nvPr/>
+        </p:nvGrpSpPr>
+        <p:grpSpPr>
+          <a:xfrm>
+            <a:off x="1828800" y="1690688"/>
+            <a:ext cx="4143375" cy="4095750"/>
+            <a:chOff x="1828800" y="1690688"/>
+            <a:chExt cx="4143375" cy="4095750"/>
+          </a:xfrm>
+        </p:grpSpPr>
+        <p:sp>
+          <p:nvSpPr>
+            <p:cNvPr id="7" name="Rechteck 6">
+              <a:extLst>
+                <a:ext uri="{FF2B5EF4-FFF2-40B4-BE49-F238E27FC236}">
+                  <a16:creationId xmlns:a16="http://schemas.microsoft.com/office/drawing/2014/main" id="{C19B9F64-C932-CB4A-AA2B-301AC53CE96F}"/>
+                </a:ext>
+              </a:extLst>
+            </p:cNvPr>
+            <p:cNvSpPr/>
+            <p:nvPr/>
+          </p:nvSpPr>
+          <p:spPr>
+            <a:xfrm>
+              <a:off x="1828800" y="1690688"/>
+              <a:ext cx="3243263" cy="4095750"/>
+            </a:xfrm>
+            <a:prstGeom prst="rect">
+              <a:avLst/>
+            </a:prstGeom>
+            <a:solidFill>
+              <a:schemeClr val="bg1"/>
+            </a:solidFill>
+            <a:ln>
+              <a:noFill/>
+            </a:ln>
+          </p:spPr>
+          <p:style>
+            <a:lnRef idx="2">
+              <a:schemeClr val="accent1">
+                <a:shade val="50000"/>
+              </a:schemeClr>
+            </a:lnRef>
+            <a:fillRef idx="1">
+              <a:schemeClr val="accent1"/>
+            </a:fillRef>
+            <a:effectRef idx="0">
+              <a:schemeClr val="accent1"/>
+            </a:effectRef>
+            <a:fontRef idx="minor">
+              <a:schemeClr val="lt1"/>
+            </a:fontRef>
+          </p:style>
+          <p:txBody>
+            <a:bodyPr rtlCol="0" anchor="ctr"/>
+            <a:lstStyle/>
+            <a:p>
+              <a:pPr algn="ctr"/>
+              <a:endParaRPr lang="de-DE"/>
+            </a:p>
+          </p:txBody>
+        </p:sp>
+        <p:sp>
+          <p:nvSpPr>
+            <p:cNvPr id="8" name="Rechteck 7">
+              <a:extLst>
+                <a:ext uri="{FF2B5EF4-FFF2-40B4-BE49-F238E27FC236}">
+                  <a16:creationId xmlns:a16="http://schemas.microsoft.com/office/drawing/2014/main" id="{E7699538-7328-1145-AD59-37FE88D88BD6}"/>
+                </a:ext>
+              </a:extLst>
+            </p:cNvPr>
+            <p:cNvSpPr/>
+            <p:nvPr/>
+          </p:nvSpPr>
+          <p:spPr>
+            <a:xfrm>
+              <a:off x="4443413" y="4500563"/>
+              <a:ext cx="1528762" cy="1285875"/>
+            </a:xfrm>
+            <a:prstGeom prst="rect">
+              <a:avLst/>
+            </a:prstGeom>
+            <a:solidFill>
+              <a:schemeClr val="bg1"/>
+            </a:solidFill>
+            <a:ln>
+              <a:noFill/>
+            </a:ln>
+          </p:spPr>
+          <p:style>
+            <a:lnRef idx="2">
+              <a:schemeClr val="accent1">
+                <a:shade val="50000"/>
+              </a:schemeClr>
+            </a:lnRef>
+            <a:fillRef idx="1">
+              <a:schemeClr val="accent1"/>
+            </a:fillRef>
+            <a:effectRef idx="0">
+              <a:schemeClr val="accent1"/>
+            </a:effectRef>
+            <a:fontRef idx="minor">
+              <a:schemeClr val="lt1"/>
+            </a:fontRef>
+          </p:style>
+          <p:txBody>
+            <a:bodyPr rtlCol="0" anchor="ctr"/>
+            <a:lstStyle/>
+            <a:p>
+              <a:pPr algn="ctr"/>
+              <a:endParaRPr lang="de-DE"/>
+            </a:p>
+          </p:txBody>
+        </p:sp>
+      </p:grpSp>
+      <p:sp>
+        <p:nvSpPr>
+          <p:cNvPr id="10" name="Textfeld 9">
+            <a:extLst>
+              <a:ext uri="{FF2B5EF4-FFF2-40B4-BE49-F238E27FC236}">
+                <a16:creationId xmlns:a16="http://schemas.microsoft.com/office/drawing/2014/main" id="{921EB81A-E1D9-454F-95A0-217345CC9368}"/>
+              </a:ext>
+            </a:extLst>
+          </p:cNvPr>
+          <p:cNvSpPr txBox="1"/>
+          <p:nvPr/>
+        </p:nvSpPr>
+        <p:spPr>
+          <a:xfrm>
+            <a:off x="500064" y="2169218"/>
+            <a:ext cx="4372774" cy="1852815"/>
+          </a:xfrm>
+          <a:prstGeom prst="rect">
+            <a:avLst/>
+          </a:prstGeom>
+          <a:noFill/>
+        </p:spPr>
+        <p:txBody>
+          <a:bodyPr wrap="square" rtlCol="0">
+            <a:spAutoFit/>
+          </a:bodyPr>
+          <a:lstStyle/>
+          <a:p>
+            <a:pPr marL="285750" indent="-285750">
+              <a:lnSpc>
+                <a:spcPct val="200000"/>
+              </a:lnSpc>
+              <a:buFont typeface="Arial" panose="020B0604020202020204" pitchFamily="34" charset="0"/>
+              <a:buChar char="•"/>
+            </a:pPr>
+            <a:r>
+              <a:rPr lang="de-DE" sz="2000" dirty="0"/>
+              <a:t>Fixed </a:t>
+            </a:r>
+            <a:r>
+              <a:rPr lang="de-DE" sz="2000" dirty="0" err="1"/>
+              <a:t>Timeframe</a:t>
+            </a:r>
+            <a:endParaRPr lang="de-DE" sz="2000" dirty="0"/>
+          </a:p>
+          <a:p>
+            <a:pPr marL="285750" indent="-285750">
+              <a:lnSpc>
+                <a:spcPct val="200000"/>
+              </a:lnSpc>
+              <a:buFont typeface="Arial" panose="020B0604020202020204" pitchFamily="34" charset="0"/>
+              <a:buChar char="•"/>
+            </a:pPr>
+            <a:r>
+              <a:rPr lang="de-DE" sz="2000" dirty="0" err="1"/>
+              <a:t>Complex</a:t>
+            </a:r>
+            <a:r>
+              <a:rPr lang="de-DE" sz="2000" dirty="0"/>
               <a:t> </a:t>
             </a:r>
             <a:r>
-              <a:rPr lang="de-CH" dirty="0" err="1"/>
-              <a:t>objectives</a:t>
-            </a:r>
-            <a:r>
-              <a:rPr lang="de-CH" dirty="0"/>
+              <a:rPr lang="de-DE" sz="2000" dirty="0" err="1"/>
+              <a:t>setting</a:t>
+            </a:r>
+            <a:r>
+              <a:rPr lang="de-DE" sz="2000" dirty="0"/>
               <a:t> - </a:t>
             </a:r>
             <a:r>
-              <a:rPr lang="de-CH" dirty="0" err="1"/>
-              <a:t>goals</a:t>
-            </a:r>
-            <a:endParaRPr lang="de-CH" dirty="0"/>
-          </a:p>
-        </p:txBody>
-      </p:sp>
-      <p:sp>
-        <p:nvSpPr>
-          <p:cNvPr id="3" name="Inhaltsplatzhalter 2">
-            <a:extLst>
-              <a:ext uri="{FF2B5EF4-FFF2-40B4-BE49-F238E27FC236}">
-                <a16:creationId xmlns:a16="http://schemas.microsoft.com/office/drawing/2014/main" id="{BB612FBB-1331-4ECD-B831-33BEB896CC82}"/>
-              </a:ext>
-            </a:extLst>
-          </p:cNvPr>
-          <p:cNvSpPr>
-            <a:spLocks noGrp="1"/>
-          </p:cNvSpPr>
-          <p:nvPr>
-            <p:ph idx="1"/>
-          </p:nvPr>
-        </p:nvSpPr>
-        <p:spPr/>
-        <p:txBody>
-          <a:bodyPr/>
-          <a:lstStyle/>
-          <a:p>
-            <a:endParaRPr lang="de-CH" dirty="0"/>
+              <a:rPr lang="de-DE" sz="2000" dirty="0" err="1"/>
+              <a:t>No</a:t>
+            </a:r>
+            <a:r>
+              <a:rPr lang="de-DE" sz="2000" dirty="0"/>
+              <a:t> </a:t>
+            </a:r>
+            <a:r>
+              <a:rPr lang="de-DE" sz="2000" dirty="0" err="1"/>
+              <a:t>fixed</a:t>
+            </a:r>
+            <a:r>
+              <a:rPr lang="de-DE" sz="2000" dirty="0"/>
+              <a:t> </a:t>
+            </a:r>
+            <a:r>
+              <a:rPr lang="de-DE" sz="2000" dirty="0" err="1"/>
+              <a:t>feature</a:t>
+            </a:r>
+            <a:r>
+              <a:rPr lang="de-DE" sz="2000" dirty="0"/>
+              <a:t> </a:t>
+            </a:r>
+            <a:r>
+              <a:rPr lang="de-DE" sz="2000" dirty="0" err="1"/>
+              <a:t>set</a:t>
+            </a:r>
+            <a:endParaRPr lang="de-DE" sz="2000" dirty="0"/>
+          </a:p>
+          <a:p>
+            <a:pPr marL="285750" indent="-285750">
+              <a:lnSpc>
+                <a:spcPct val="200000"/>
+              </a:lnSpc>
+              <a:buFont typeface="Arial" panose="020B0604020202020204" pitchFamily="34" charset="0"/>
+              <a:buChar char="•"/>
+            </a:pPr>
+            <a:r>
+              <a:rPr lang="de-DE" sz="2000" dirty="0" err="1"/>
+              <a:t>No</a:t>
+            </a:r>
+            <a:r>
+              <a:rPr lang="de-DE" sz="2000" dirty="0"/>
+              <a:t> </a:t>
+            </a:r>
+            <a:r>
+              <a:rPr lang="de-DE" sz="2000" dirty="0" err="1"/>
+              <a:t>fixed</a:t>
+            </a:r>
+            <a:r>
+              <a:rPr lang="de-DE" sz="2000" dirty="0"/>
+              <a:t> </a:t>
+            </a:r>
+            <a:r>
+              <a:rPr lang="de-DE" sz="2000" dirty="0" err="1"/>
+              <a:t>technology</a:t>
+            </a:r>
+            <a:endParaRPr lang="de-DE" sz="2000" dirty="0"/>
           </a:p>
         </p:txBody>
       </p:sp>
@@ -3712,6 +4031,249 @@
   <p:clrMapOvr>
     <a:masterClrMapping/>
   </p:clrMapOvr>
+  <p:timing>
+    <p:tnLst>
+      <p:par>
+        <p:cTn id="1" dur="indefinite" restart="never" nodeType="tmRoot">
+          <p:childTnLst>
+            <p:seq concurrent="1" nextAc="seek">
+              <p:cTn id="2" dur="indefinite" nodeType="mainSeq">
+                <p:childTnLst>
+                  <p:par>
+                    <p:cTn id="3" fill="hold">
+                      <p:stCondLst>
+                        <p:cond delay="indefinite"/>
+                      </p:stCondLst>
+                      <p:childTnLst>
+                        <p:par>
+                          <p:cTn id="4" fill="hold">
+                            <p:stCondLst>
+                              <p:cond delay="0"/>
+                            </p:stCondLst>
+                            <p:childTnLst>
+                              <p:par>
+                                <p:cTn id="5" presetID="10" presetClass="entr" presetSubtype="0" fill="hold" nodeType="clickEffect">
+                                  <p:stCondLst>
+                                    <p:cond delay="0"/>
+                                  </p:stCondLst>
+                                  <p:childTnLst>
+                                    <p:set>
+                                      <p:cBhvr>
+                                        <p:cTn id="6" dur="1" fill="hold">
+                                          <p:stCondLst>
+                                            <p:cond delay="0"/>
+                                          </p:stCondLst>
+                                        </p:cTn>
+                                        <p:tgtEl>
+                                          <p:spTgt spid="5"/>
+                                        </p:tgtEl>
+                                        <p:attrNameLst>
+                                          <p:attrName>style.visibility</p:attrName>
+                                        </p:attrNameLst>
+                                      </p:cBhvr>
+                                      <p:to>
+                                        <p:strVal val="visible"/>
+                                      </p:to>
+                                    </p:set>
+                                    <p:animEffect transition="in" filter="fade">
+                                      <p:cBhvr>
+                                        <p:cTn id="7" dur="500"/>
+                                        <p:tgtEl>
+                                          <p:spTgt spid="5"/>
+                                        </p:tgtEl>
+                                      </p:cBhvr>
+                                    </p:animEffect>
+                                  </p:childTnLst>
+                                </p:cTn>
+                              </p:par>
+                              <p:par>
+                                <p:cTn id="8" presetID="1" presetClass="entr" presetSubtype="0" fill="hold" grpId="0" nodeType="withEffect">
+                                  <p:stCondLst>
+                                    <p:cond delay="0"/>
+                                  </p:stCondLst>
+                                  <p:childTnLst>
+                                    <p:set>
+                                      <p:cBhvr>
+                                        <p:cTn id="9" dur="1" fill="hold">
+                                          <p:stCondLst>
+                                            <p:cond delay="0"/>
+                                          </p:stCondLst>
+                                        </p:cTn>
+                                        <p:tgtEl>
+                                          <p:spTgt spid="6"/>
+                                        </p:tgtEl>
+                                        <p:attrNameLst>
+                                          <p:attrName>style.visibility</p:attrName>
+                                        </p:attrNameLst>
+                                      </p:cBhvr>
+                                      <p:to>
+                                        <p:strVal val="visible"/>
+                                      </p:to>
+                                    </p:set>
+                                  </p:childTnLst>
+                                </p:cTn>
+                              </p:par>
+                            </p:childTnLst>
+                          </p:cTn>
+                        </p:par>
+                      </p:childTnLst>
+                    </p:cTn>
+                  </p:par>
+                  <p:par>
+                    <p:cTn id="10" fill="hold">
+                      <p:stCondLst>
+                        <p:cond delay="indefinite"/>
+                      </p:stCondLst>
+                      <p:childTnLst>
+                        <p:par>
+                          <p:cTn id="11" fill="hold">
+                            <p:stCondLst>
+                              <p:cond delay="0"/>
+                            </p:stCondLst>
+                            <p:childTnLst>
+                              <p:par>
+                                <p:cTn id="12" presetID="42" presetClass="path" presetSubtype="0" accel="50000" decel="50000" fill="hold" grpId="1" nodeType="clickEffect">
+                                  <p:stCondLst>
+                                    <p:cond delay="0"/>
+                                  </p:stCondLst>
+                                  <p:childTnLst>
+                                    <p:animMotion origin="layout" path="M 4.79167E-6 0 L 0.46354 0.00208 " pathEditMode="relative" rAng="0" ptsTypes="AA">
+                                      <p:cBhvr>
+                                        <p:cTn id="13" dur="2000" fill="hold"/>
+                                        <p:tgtEl>
+                                          <p:spTgt spid="6"/>
+                                        </p:tgtEl>
+                                        <p:attrNameLst>
+                                          <p:attrName>ppt_x</p:attrName>
+                                          <p:attrName>ppt_y</p:attrName>
+                                        </p:attrNameLst>
+                                      </p:cBhvr>
+                                      <p:rCtr x="23177" y="93"/>
+                                    </p:animMotion>
+                                  </p:childTnLst>
+                                </p:cTn>
+                              </p:par>
+                            </p:childTnLst>
+                          </p:cTn>
+                        </p:par>
+                      </p:childTnLst>
+                    </p:cTn>
+                  </p:par>
+                  <p:par>
+                    <p:cTn id="14" fill="hold">
+                      <p:stCondLst>
+                        <p:cond delay="indefinite"/>
+                      </p:stCondLst>
+                      <p:childTnLst>
+                        <p:par>
+                          <p:cTn id="15" fill="hold">
+                            <p:stCondLst>
+                              <p:cond delay="0"/>
+                            </p:stCondLst>
+                            <p:childTnLst>
+                              <p:par>
+                                <p:cTn id="16" presetID="10" presetClass="entr" presetSubtype="0" fill="hold" nodeType="clickEffect">
+                                  <p:stCondLst>
+                                    <p:cond delay="0"/>
+                                  </p:stCondLst>
+                                  <p:childTnLst>
+                                    <p:set>
+                                      <p:cBhvr>
+                                        <p:cTn id="17" dur="1" fill="hold">
+                                          <p:stCondLst>
+                                            <p:cond delay="0"/>
+                                          </p:stCondLst>
+                                        </p:cTn>
+                                        <p:tgtEl>
+                                          <p:spTgt spid="9"/>
+                                        </p:tgtEl>
+                                        <p:attrNameLst>
+                                          <p:attrName>style.visibility</p:attrName>
+                                        </p:attrNameLst>
+                                      </p:cBhvr>
+                                      <p:to>
+                                        <p:strVal val="visible"/>
+                                      </p:to>
+                                    </p:set>
+                                    <p:animEffect transition="in" filter="fade">
+                                      <p:cBhvr>
+                                        <p:cTn id="18" dur="500"/>
+                                        <p:tgtEl>
+                                          <p:spTgt spid="9"/>
+                                        </p:tgtEl>
+                                      </p:cBhvr>
+                                    </p:animEffect>
+                                  </p:childTnLst>
+                                </p:cTn>
+                              </p:par>
+                              <p:par>
+                                <p:cTn id="19" presetID="10" presetClass="entr" presetSubtype="0" fill="hold" grpId="0" nodeType="withEffect">
+                                  <p:stCondLst>
+                                    <p:cond delay="500"/>
+                                  </p:stCondLst>
+                                  <p:childTnLst>
+                                    <p:set>
+                                      <p:cBhvr>
+                                        <p:cTn id="20" dur="1" fill="hold">
+                                          <p:stCondLst>
+                                            <p:cond delay="0"/>
+                                          </p:stCondLst>
+                                        </p:cTn>
+                                        <p:tgtEl>
+                                          <p:spTgt spid="10"/>
+                                        </p:tgtEl>
+                                        <p:attrNameLst>
+                                          <p:attrName>style.visibility</p:attrName>
+                                        </p:attrNameLst>
+                                      </p:cBhvr>
+                                      <p:to>
+                                        <p:strVal val="visible"/>
+                                      </p:to>
+                                    </p:set>
+                                    <p:animEffect transition="in" filter="fade">
+                                      <p:cBhvr>
+                                        <p:cTn id="21" dur="500"/>
+                                        <p:tgtEl>
+                                          <p:spTgt spid="10"/>
+                                        </p:tgtEl>
+                                      </p:cBhvr>
+                                    </p:animEffect>
+                                  </p:childTnLst>
+                                </p:cTn>
+                              </p:par>
+                            </p:childTnLst>
+                          </p:cTn>
+                        </p:par>
+                      </p:childTnLst>
+                    </p:cTn>
+                  </p:par>
+                </p:childTnLst>
+              </p:cTn>
+              <p:prevCondLst>
+                <p:cond evt="onPrev" delay="0">
+                  <p:tgtEl>
+                    <p:sldTgt/>
+                  </p:tgtEl>
+                </p:cond>
+              </p:prevCondLst>
+              <p:nextCondLst>
+                <p:cond evt="onNext" delay="0">
+                  <p:tgtEl>
+                    <p:sldTgt/>
+                  </p:tgtEl>
+                </p:cond>
+              </p:nextCondLst>
+            </p:seq>
+          </p:childTnLst>
+        </p:cTn>
+      </p:par>
+    </p:tnLst>
+    <p:bldLst>
+      <p:bldP spid="6" grpId="0" animBg="1"/>
+      <p:bldP spid="6" grpId="1" animBg="1"/>
+      <p:bldP spid="10" grpId="0"/>
+    </p:bldLst>
+  </p:timing>
 </p:sld>
 </file>
 

</xml_diff>